<commit_message>
Opprettet bildefil for TraktorvegSTi
</commit_message>
<xml_diff>
--- a/figurer/TraktorvegSti/skisser.pptx
+++ b/figurer/TraktorvegSti/skisser.pptx
@@ -3067,11 +3067,7 @@
             </a:r>
             <a:r>
               <a:rPr lang="nb-NO" dirty="0" smtClean="0"/>
-              <a:t> (enkel </a:t>
-            </a:r>
-            <a:r>
-              <a:rPr lang="nb-NO" smtClean="0"/>
-              <a:t>bilveg fra </a:t>
+              <a:t> (enkel bilveg fra </a:t>
             </a:r>
             <a:r>
               <a:rPr lang="nb-NO" dirty="0" err="1" smtClean="0"/>

</xml_diff>